<commit_message>
Small update on EDA slide
Small update on EDA slide
</commit_message>
<xml_diff>
--- a/output/reports/Group9_Phase1_Slides.pptx
+++ b/output/reports/Group9_Phase1_Slides.pptx
@@ -234,7 +234,7 @@
           <a:p>
             <a:fld id="{C87859BD-4604-2843-976C-9F2DEE3C79DB}" type="datetimeFigureOut">
               <a:rPr lang="en-US" smtClean="0"/>
-              <a:t>4/18/2021</a:t>
+              <a:t>4/19/2021</a:t>
             </a:fld>
             <a:endParaRPr lang="en-US"/>
           </a:p>
@@ -399,7 +399,7 @@
           <a:p>
             <a:fld id="{DE108F45-8DB7-E449-85E4-EC04F96DF3AA}" type="datetimeFigureOut">
               <a:rPr lang="en-US" smtClean="0"/>
-              <a:t>4/18/2021</a:t>
+              <a:t>4/19/2021</a:t>
             </a:fld>
             <a:endParaRPr lang="en-US"/>
           </a:p>
@@ -5414,7 +5414,7 @@
             <p:ph idx="1"/>
             <p:extLst>
               <p:ext uri="{D42A27DB-BD31-4B8C-83A1-F6EECF244321}">
-                <p14:modId xmlns:p14="http://schemas.microsoft.com/office/powerpoint/2010/main" val="3736400536"/>
+                <p14:modId xmlns:p14="http://schemas.microsoft.com/office/powerpoint/2010/main" val="589091479"/>
               </p:ext>
             </p:extLst>
           </p:nvPr>
@@ -5635,7 +5635,7 @@
                     <a:p>
                       <a:r>
                         <a:rPr lang="en-US" sz="1400" dirty="0"/>
-                        <a:t>156 features have 0 importance.</a:t>
+                        <a:t>Many features have 0 importance.</a:t>
                       </a:r>
                     </a:p>
                   </a:txBody>
@@ -7283,24 +7283,6 @@
 </file>
 
 <file path=customXml/item1.xml><?xml version="1.0" encoding="utf-8"?>
-<p:properties xmlns:p="http://schemas.microsoft.com/office/2006/metadata/properties" xmlns:xsi="http://www.w3.org/2001/XMLSchema-instance" xmlns:pc="http://schemas.microsoft.com/office/infopath/2007/PartnerControls">
-  <documentManagement>
-    <_Version xmlns="http://schemas.microsoft.com/sharepoint/v3/fields" xsi:nil="true"/>
-    <_Status xmlns="http://schemas.microsoft.com/sharepoint/v3/fields">Not Started</_Status>
-  </documentManagement>
-</p:properties>
-</file>
-
-<file path=customXml/item2.xml><?xml version="1.0" encoding="utf-8"?>
-<?mso-contentType ?>
-<FormTemplates xmlns="http://schemas.microsoft.com/sharepoint/v3/contenttype/forms">
-  <Display>DocumentLibraryForm</Display>
-  <Edit>DocumentLibraryForm</Edit>
-  <New>DocumentLibraryForm</New>
-</FormTemplates>
-</file>
-
-<file path=customXml/item3.xml><?xml version="1.0" encoding="utf-8"?>
 <ct:contentTypeSchema xmlns:ct="http://schemas.microsoft.com/office/2006/metadata/contentType" xmlns:ma="http://schemas.microsoft.com/office/2006/metadata/properties/metaAttributes" ct:_="" ma:_="" ma:contentTypeName="Document" ma:contentTypeID="0x0101000DE64AEEDD9B7A4D93545ACBE97D4615" ma:contentTypeVersion="2" ma:contentTypeDescription="Create a new document." ma:contentTypeScope="" ma:versionID="f49002b78e3a4a71b814eef46a983816">
   <xsd:schema xmlns:xsd="http://www.w3.org/2001/XMLSchema" xmlns:xs="http://www.w3.org/2001/XMLSchema" xmlns:p="http://schemas.microsoft.com/office/2006/metadata/properties" xmlns:ns2="http://schemas.microsoft.com/sharepoint/v3/fields" targetNamespace="http://schemas.microsoft.com/office/2006/metadata/properties" ma:root="true" ma:fieldsID="38f6db2dd0d9a0cf6a8dc37be32b365b" ns2:_="">
     <xsd:import namespace="http://schemas.microsoft.com/sharepoint/v3/fields"/>
@@ -7444,25 +7426,25 @@
 </ct:contentTypeSchema>
 </file>
 
-<file path=customXml/itemProps1.xml><?xml version="1.0" encoding="utf-8"?>
-<ds:datastoreItem xmlns:ds="http://schemas.openxmlformats.org/officeDocument/2006/customXml" ds:itemID="{7B6F2769-7194-4217-93D3-3AF3A4742282}">
-  <ds:schemaRefs>
-    <ds:schemaRef ds:uri="http://schemas.microsoft.com/office/2006/metadata/properties"/>
-    <ds:schemaRef ds:uri="http://schemas.microsoft.com/office/infopath/2007/PartnerControls"/>
-    <ds:schemaRef ds:uri="http://schemas.microsoft.com/sharepoint/v3/fields"/>
-  </ds:schemaRefs>
-</ds:datastoreItem>
+<file path=customXml/item2.xml><?xml version="1.0" encoding="utf-8"?>
+<?mso-contentType ?>
+<FormTemplates xmlns="http://schemas.microsoft.com/sharepoint/v3/contenttype/forms">
+  <Display>DocumentLibraryForm</Display>
+  <Edit>DocumentLibraryForm</Edit>
+  <New>DocumentLibraryForm</New>
+</FormTemplates>
 </file>
 
-<file path=customXml/itemProps2.xml><?xml version="1.0" encoding="utf-8"?>
-<ds:datastoreItem xmlns:ds="http://schemas.openxmlformats.org/officeDocument/2006/customXml" ds:itemID="{87D2A1B0-FF3E-4009-940D-AED0EB70AA20}">
-  <ds:schemaRefs>
-    <ds:schemaRef ds:uri="http://schemas.microsoft.com/sharepoint/v3/contenttype/forms"/>
-  </ds:schemaRefs>
-</ds:datastoreItem>
+<file path=customXml/item3.xml><?xml version="1.0" encoding="utf-8"?>
+<p:properties xmlns:p="http://schemas.microsoft.com/office/2006/metadata/properties" xmlns:xsi="http://www.w3.org/2001/XMLSchema-instance" xmlns:pc="http://schemas.microsoft.com/office/infopath/2007/PartnerControls">
+  <documentManagement>
+    <_Version xmlns="http://schemas.microsoft.com/sharepoint/v3/fields" xsi:nil="true"/>
+    <_Status xmlns="http://schemas.microsoft.com/sharepoint/v3/fields">Not Started</_Status>
+  </documentManagement>
+</p:properties>
 </file>
 
-<file path=customXml/itemProps3.xml><?xml version="1.0" encoding="utf-8"?>
+<file path=customXml/itemProps1.xml><?xml version="1.0" encoding="utf-8"?>
 <ds:datastoreItem xmlns:ds="http://schemas.openxmlformats.org/officeDocument/2006/customXml" ds:itemID="{E4214858-785C-42F7-BE66-6D0E79395FC8}">
   <ds:schemaRefs>
     <ds:schemaRef ds:uri="http://schemas.microsoft.com/office/2006/metadata/contentType"/>
@@ -7478,4 +7460,22 @@
     <ds:schemaRef ds:uri="http://schemas.microsoft.com/internal/obd"/>
   </ds:schemaRefs>
 </ds:datastoreItem>
+</file>
+
+<file path=customXml/itemProps2.xml><?xml version="1.0" encoding="utf-8"?>
+<ds:datastoreItem xmlns:ds="http://schemas.openxmlformats.org/officeDocument/2006/customXml" ds:itemID="{87D2A1B0-FF3E-4009-940D-AED0EB70AA20}">
+  <ds:schemaRefs>
+    <ds:schemaRef ds:uri="http://schemas.microsoft.com/sharepoint/v3/contenttype/forms"/>
+  </ds:schemaRefs>
+</ds:datastoreItem>
+</file>
+
+<file path=customXml/itemProps3.xml><?xml version="1.0" encoding="utf-8"?>
+<ds:datastoreItem xmlns:ds="http://schemas.openxmlformats.org/officeDocument/2006/customXml" ds:itemID="{7B6F2769-7194-4217-93D3-3AF3A4742282}">
+  <ds:schemaRefs>
+    <ds:schemaRef ds:uri="http://schemas.microsoft.com/office/2006/metadata/properties"/>
+    <ds:schemaRef ds:uri="http://schemas.microsoft.com/office/infopath/2007/PartnerControls"/>
+    <ds:schemaRef ds:uri="http://schemas.microsoft.com/sharepoint/v3/fields"/>
+  </ds:schemaRefs>
+</ds:datastoreItem>
 </file>
</xml_diff>

<commit_message>
Slide update and transcript add
Slide update and transcript add
</commit_message>
<xml_diff>
--- a/output/reports/Group9_Phase1_Slides.pptx
+++ b/output/reports/Group9_Phase1_Slides.pptx
@@ -150,6 +150,58 @@
     </p:ext>
   </p:extLst>
 </p:presentation>
+</file>
+
+<file path=ppt/changesInfos/changesInfo1.xml><?xml version="1.0" encoding="utf-8"?>
+<pc:chgInfo xmlns:a="http://schemas.openxmlformats.org/drawingml/2006/main" xmlns:r="http://schemas.openxmlformats.org/officeDocument/2006/relationships" xmlns:ac="http://schemas.microsoft.com/office/drawing/2013/main/command" xmlns:pc="http://schemas.microsoft.com/office/powerpoint/2013/main/command">
+  <pc:docChgLst>
+    <pc:chgData name="Ashley Thornton" userId="b6e3fc805ef79445" providerId="LiveId" clId="{66985B05-F46C-4332-AB4E-4983A0ADFF50}"/>
+    <pc:docChg chg="custSel modSld">
+      <pc:chgData name="Ashley Thornton" userId="b6e3fc805ef79445" providerId="LiveId" clId="{66985B05-F46C-4332-AB4E-4983A0ADFF50}" dt="2021-04-19T21:42:01.484" v="19" actId="1037"/>
+      <pc:docMkLst>
+        <pc:docMk/>
+      </pc:docMkLst>
+      <pc:sldChg chg="modSp mod">
+        <pc:chgData name="Ashley Thornton" userId="b6e3fc805ef79445" providerId="LiveId" clId="{66985B05-F46C-4332-AB4E-4983A0ADFF50}" dt="2021-04-19T16:04:37.682" v="6" actId="20577"/>
+        <pc:sldMkLst>
+          <pc:docMk/>
+          <pc:sldMk cId="2549050200" sldId="329"/>
+        </pc:sldMkLst>
+        <pc:graphicFrameChg chg="modGraphic">
+          <ac:chgData name="Ashley Thornton" userId="b6e3fc805ef79445" providerId="LiveId" clId="{66985B05-F46C-4332-AB4E-4983A0ADFF50}" dt="2021-04-19T16:04:37.682" v="6" actId="20577"/>
+          <ac:graphicFrameMkLst>
+            <pc:docMk/>
+            <pc:sldMk cId="2549050200" sldId="329"/>
+            <ac:graphicFrameMk id="17" creationId="{78016645-56E0-4117-B34A-89689894EF6B}"/>
+          </ac:graphicFrameMkLst>
+        </pc:graphicFrameChg>
+      </pc:sldChg>
+      <pc:sldChg chg="addSp delSp modSp mod">
+        <pc:chgData name="Ashley Thornton" userId="b6e3fc805ef79445" providerId="LiveId" clId="{66985B05-F46C-4332-AB4E-4983A0ADFF50}" dt="2021-04-19T21:42:01.484" v="19" actId="1037"/>
+        <pc:sldMkLst>
+          <pc:docMk/>
+          <pc:sldMk cId="3096087899" sldId="337"/>
+        </pc:sldMkLst>
+        <pc:picChg chg="del">
+          <ac:chgData name="Ashley Thornton" userId="b6e3fc805ef79445" providerId="LiveId" clId="{66985B05-F46C-4332-AB4E-4983A0ADFF50}" dt="2021-04-19T21:41:26.667" v="11" actId="478"/>
+          <ac:picMkLst>
+            <pc:docMk/>
+            <pc:sldMk cId="3096087899" sldId="337"/>
+            <ac:picMk id="4" creationId="{9C15AAF1-8E22-4B49-803F-A64D3B0D8E3A}"/>
+          </ac:picMkLst>
+        </pc:picChg>
+        <pc:picChg chg="add mod">
+          <ac:chgData name="Ashley Thornton" userId="b6e3fc805ef79445" providerId="LiveId" clId="{66985B05-F46C-4332-AB4E-4983A0ADFF50}" dt="2021-04-19T21:42:01.484" v="19" actId="1037"/>
+          <ac:picMkLst>
+            <pc:docMk/>
+            <pc:sldMk cId="3096087899" sldId="337"/>
+            <ac:picMk id="5" creationId="{401FDDEB-A2A9-49C4-84D4-19B6A46C95D4}"/>
+          </ac:picMkLst>
+        </pc:picChg>
+      </pc:sldChg>
+    </pc:docChg>
+  </pc:docChgLst>
+</pc:chgInfo>
 </file>
 
 <file path=ppt/handoutMasters/handoutMaster1.xml><?xml version="1.0" encoding="utf-8"?>
@@ -5414,7 +5466,7 @@
             <p:ph idx="1"/>
             <p:extLst>
               <p:ext uri="{D42A27DB-BD31-4B8C-83A1-F6EECF244321}">
-                <p14:modId xmlns:p14="http://schemas.microsoft.com/office/powerpoint/2010/main" val="589091479"/>
+                <p14:modId xmlns:p14="http://schemas.microsoft.com/office/powerpoint/2010/main" val="3435664368"/>
               </p:ext>
             </p:extLst>
           </p:nvPr>
@@ -5634,8 +5686,12 @@
                     <a:lstStyle/>
                     <a:p>
                       <a:r>
+                        <a:rPr lang="en-US" sz="1400"/>
+                        <a:t>Many </a:t>
+                      </a:r>
+                      <a:r>
                         <a:rPr lang="en-US" sz="1400" dirty="0"/>
-                        <a:t>Many features have 0 importance.</a:t>
+                        <a:t>features have 0 importance.</a:t>
                       </a:r>
                     </a:p>
                   </a:txBody>
@@ -5887,10 +5943,10 @@
       </p:sp>
       <p:pic>
         <p:nvPicPr>
-          <p:cNvPr id="4" name="Picture 3">
+          <p:cNvPr id="5" name="Picture 4">
             <a:extLst>
               <a:ext uri="{FF2B5EF4-FFF2-40B4-BE49-F238E27FC236}">
-                <a16:creationId xmlns:a16="http://schemas.microsoft.com/office/drawing/2014/main" id="{9C15AAF1-8E22-4B49-803F-A64D3B0D8E3A}"/>
+                <a16:creationId xmlns:a16="http://schemas.microsoft.com/office/drawing/2014/main" id="{401FDDEB-A2A9-49C4-84D4-19B6A46C95D4}"/>
               </a:ext>
             </a:extLst>
           </p:cNvPr>
@@ -5907,8 +5963,8 @@
         </p:blipFill>
         <p:spPr>
           <a:xfrm>
-            <a:off x="594764" y="1809753"/>
-            <a:ext cx="7954471" cy="1667487"/>
+            <a:off x="319669" y="1872751"/>
+            <a:ext cx="8562185" cy="1055838"/>
           </a:xfrm>
           <a:prstGeom prst="rect">
             <a:avLst/>
@@ -7283,6 +7339,24 @@
 </file>
 
 <file path=customXml/item1.xml><?xml version="1.0" encoding="utf-8"?>
+<p:properties xmlns:p="http://schemas.microsoft.com/office/2006/metadata/properties" xmlns:xsi="http://www.w3.org/2001/XMLSchema-instance" xmlns:pc="http://schemas.microsoft.com/office/infopath/2007/PartnerControls">
+  <documentManagement>
+    <_Version xmlns="http://schemas.microsoft.com/sharepoint/v3/fields" xsi:nil="true"/>
+    <_Status xmlns="http://schemas.microsoft.com/sharepoint/v3/fields">Not Started</_Status>
+  </documentManagement>
+</p:properties>
+</file>
+
+<file path=customXml/item2.xml><?xml version="1.0" encoding="utf-8"?>
+<?mso-contentType ?>
+<FormTemplates xmlns="http://schemas.microsoft.com/sharepoint/v3/contenttype/forms">
+  <Display>DocumentLibraryForm</Display>
+  <Edit>DocumentLibraryForm</Edit>
+  <New>DocumentLibraryForm</New>
+</FormTemplates>
+</file>
+
+<file path=customXml/item3.xml><?xml version="1.0" encoding="utf-8"?>
 <ct:contentTypeSchema xmlns:ct="http://schemas.microsoft.com/office/2006/metadata/contentType" xmlns:ma="http://schemas.microsoft.com/office/2006/metadata/properties/metaAttributes" ct:_="" ma:_="" ma:contentTypeName="Document" ma:contentTypeID="0x0101000DE64AEEDD9B7A4D93545ACBE97D4615" ma:contentTypeVersion="2" ma:contentTypeDescription="Create a new document." ma:contentTypeScope="" ma:versionID="f49002b78e3a4a71b814eef46a983816">
   <xsd:schema xmlns:xsd="http://www.w3.org/2001/XMLSchema" xmlns:xs="http://www.w3.org/2001/XMLSchema" xmlns:p="http://schemas.microsoft.com/office/2006/metadata/properties" xmlns:ns2="http://schemas.microsoft.com/sharepoint/v3/fields" targetNamespace="http://schemas.microsoft.com/office/2006/metadata/properties" ma:root="true" ma:fieldsID="38f6db2dd0d9a0cf6a8dc37be32b365b" ns2:_="">
     <xsd:import namespace="http://schemas.microsoft.com/sharepoint/v3/fields"/>
@@ -7426,25 +7500,25 @@
 </ct:contentTypeSchema>
 </file>
 
-<file path=customXml/item2.xml><?xml version="1.0" encoding="utf-8"?>
-<?mso-contentType ?>
-<FormTemplates xmlns="http://schemas.microsoft.com/sharepoint/v3/contenttype/forms">
-  <Display>DocumentLibraryForm</Display>
-  <Edit>DocumentLibraryForm</Edit>
-  <New>DocumentLibraryForm</New>
-</FormTemplates>
+<file path=customXml/itemProps1.xml><?xml version="1.0" encoding="utf-8"?>
+<ds:datastoreItem xmlns:ds="http://schemas.openxmlformats.org/officeDocument/2006/customXml" ds:itemID="{7B6F2769-7194-4217-93D3-3AF3A4742282}">
+  <ds:schemaRefs>
+    <ds:schemaRef ds:uri="http://schemas.microsoft.com/office/2006/metadata/properties"/>
+    <ds:schemaRef ds:uri="http://schemas.microsoft.com/office/infopath/2007/PartnerControls"/>
+    <ds:schemaRef ds:uri="http://schemas.microsoft.com/sharepoint/v3/fields"/>
+  </ds:schemaRefs>
+</ds:datastoreItem>
 </file>
 
-<file path=customXml/item3.xml><?xml version="1.0" encoding="utf-8"?>
-<p:properties xmlns:p="http://schemas.microsoft.com/office/2006/metadata/properties" xmlns:xsi="http://www.w3.org/2001/XMLSchema-instance" xmlns:pc="http://schemas.microsoft.com/office/infopath/2007/PartnerControls">
-  <documentManagement>
-    <_Version xmlns="http://schemas.microsoft.com/sharepoint/v3/fields" xsi:nil="true"/>
-    <_Status xmlns="http://schemas.microsoft.com/sharepoint/v3/fields">Not Started</_Status>
-  </documentManagement>
-</p:properties>
+<file path=customXml/itemProps2.xml><?xml version="1.0" encoding="utf-8"?>
+<ds:datastoreItem xmlns:ds="http://schemas.openxmlformats.org/officeDocument/2006/customXml" ds:itemID="{87D2A1B0-FF3E-4009-940D-AED0EB70AA20}">
+  <ds:schemaRefs>
+    <ds:schemaRef ds:uri="http://schemas.microsoft.com/sharepoint/v3/contenttype/forms"/>
+  </ds:schemaRefs>
+</ds:datastoreItem>
 </file>
 
-<file path=customXml/itemProps1.xml><?xml version="1.0" encoding="utf-8"?>
+<file path=customXml/itemProps3.xml><?xml version="1.0" encoding="utf-8"?>
 <ds:datastoreItem xmlns:ds="http://schemas.openxmlformats.org/officeDocument/2006/customXml" ds:itemID="{E4214858-785C-42F7-BE66-6D0E79395FC8}">
   <ds:schemaRefs>
     <ds:schemaRef ds:uri="http://schemas.microsoft.com/office/2006/metadata/contentType"/>
@@ -7460,22 +7534,4 @@
     <ds:schemaRef ds:uri="http://schemas.microsoft.com/internal/obd"/>
   </ds:schemaRefs>
 </ds:datastoreItem>
-</file>
-
-<file path=customXml/itemProps2.xml><?xml version="1.0" encoding="utf-8"?>
-<ds:datastoreItem xmlns:ds="http://schemas.openxmlformats.org/officeDocument/2006/customXml" ds:itemID="{87D2A1B0-FF3E-4009-940D-AED0EB70AA20}">
-  <ds:schemaRefs>
-    <ds:schemaRef ds:uri="http://schemas.microsoft.com/sharepoint/v3/contenttype/forms"/>
-  </ds:schemaRefs>
-</ds:datastoreItem>
-</file>
-
-<file path=customXml/itemProps3.xml><?xml version="1.0" encoding="utf-8"?>
-<ds:datastoreItem xmlns:ds="http://schemas.openxmlformats.org/officeDocument/2006/customXml" ds:itemID="{7B6F2769-7194-4217-93D3-3AF3A4742282}">
-  <ds:schemaRefs>
-    <ds:schemaRef ds:uri="http://schemas.microsoft.com/office/2006/metadata/properties"/>
-    <ds:schemaRef ds:uri="http://schemas.microsoft.com/office/infopath/2007/PartnerControls"/>
-    <ds:schemaRef ds:uri="http://schemas.microsoft.com/sharepoint/v3/fields"/>
-  </ds:schemaRefs>
-</ds:datastoreItem>
 </file>
</xml_diff>